<commit_message>
Updates to preferred solution diagram
</commit_message>
<xml_diff>
--- a/Whiteboard design session/WDS trainer presentation - Cloud-native applications.pptx
+++ b/Whiteboard design session/WDS trainer presentation - Cloud-native applications.pptx
@@ -220,7 +220,7 @@
           <a:p>
             <a:fld id="{52A13B17-C506-4D51-BB37-16B365906619}" type="datetimeFigureOut">
               <a:rPr lang="en-US" smtClean="0"/>
-              <a:t>2/24/2020</a:t>
+              <a:t>6/30/20</a:t>
             </a:fld>
             <a:endParaRPr lang="en-US" dirty="0"/>
           </a:p>
@@ -1485,6 +1485,19 @@
           <a:bodyPr/>
           <a:lstStyle/>
           <a:p>
+            <a:r>
+              <a:rPr lang="en-US"/>
+              <a:t>Reference Links:</a:t>
+            </a:r>
+            <a:endParaRPr lang="en-US" dirty="0"/>
+          </a:p>
+          <a:p>
+            <a:r>
+              <a:rPr lang="en-US" dirty="0">
+                <a:hlinkClick r:id="rId3"/>
+              </a:rPr>
+              <a:t>https://docs.microsoft.com/en-us/azure/architecture/reference-architectures/microservices/aks</a:t>
+            </a:r>
             <a:endParaRPr lang="en-US" dirty="0"/>
           </a:p>
         </p:txBody>
@@ -2154,7 +2167,7 @@
                   <a:prstClr val="black"/>
                 </a:solidFill>
               </a:rPr>
-              <a:t>2/24/2020 4:06 PM</a:t>
+              <a:t>6/30/20 4:36 PM</a:t>
             </a:fld>
             <a:endParaRPr lang="en-US" dirty="0">
               <a:solidFill>
@@ -17107,7 +17120,7 @@
       </p:sp>
       <p:pic>
         <p:nvPicPr>
-          <p:cNvPr id="4" name="Picture 3" descr="A diagram showing the solution, using Azure Kubernetes Service with a CosmosDB back end.">
+          <p:cNvPr id="4" name="Picture 3">
             <a:extLst>
               <a:ext uri="{FF2B5EF4-FFF2-40B4-BE49-F238E27FC236}">
                 <a16:creationId xmlns:a16="http://schemas.microsoft.com/office/drawing/2014/main" id="{A77DE13A-AD2C-4759-A6A4-111012127BDB}"/>
@@ -17120,15 +17133,20 @@
           <p:nvPr/>
         </p:nvPicPr>
         <p:blipFill>
-          <a:blip r:embed="rId3"/>
-          <a:stretch>
-            <a:fillRect/>
-          </a:stretch>
+          <a:blip r:embed="rId3">
+            <a:extLst>
+              <a:ext uri="{28A0092B-C50C-407E-A947-70E740481C1C}">
+                <a14:useLocalDpi xmlns:a14="http://schemas.microsoft.com/office/drawing/2010/main" val="0"/>
+              </a:ext>
+            </a:extLst>
+          </a:blip>
+          <a:srcRect/>
+          <a:stretch/>
         </p:blipFill>
         <p:spPr>
           <a:xfrm>
-            <a:off x="1715911" y="1369575"/>
-            <a:ext cx="9014287" cy="5352957"/>
+            <a:off x="1181177" y="1189176"/>
+            <a:ext cx="9829646" cy="5529175"/>
           </a:xfrm>
           <a:prstGeom prst="rect">
             <a:avLst/>
@@ -17505,7 +17523,7 @@
             <a:pPr lvl="2"/>
             <a:r>
               <a:rPr lang="en-US" sz="2800" dirty="0"/>
-              <a:t>Web App for Containers – simple PaaS without full-featured container orchestration</a:t>
+              <a:t>Azure Kubernetes Services (AKS) – the ideal solution for a fully managed experience</a:t>
             </a:r>
           </a:p>
           <a:p>
@@ -17519,8 +17537,12 @@
             <a:pPr lvl="2"/>
             <a:r>
               <a:rPr lang="en-US" sz="2800" dirty="0"/>
-              <a:t>Azure Kubernetes Services (AKS) – the ideal solution for a fully managed experience</a:t>
-            </a:r>
+              <a:t>Web App for Containers – simple PaaS without full-featured container orchestration</a:t>
+            </a:r>
+          </a:p>
+          <a:p>
+            <a:pPr lvl="2"/>
+            <a:endParaRPr lang="en-US" sz="2800" dirty="0"/>
           </a:p>
         </p:txBody>
       </p:sp>

</xml_diff>

<commit_message>
updates to design session
</commit_message>
<xml_diff>
--- a/Whiteboard design session/WDS trainer presentation - Cloud-native applications.pptx
+++ b/Whiteboard design session/WDS trainer presentation - Cloud-native applications.pptx
@@ -220,7 +220,7 @@
           <a:p>
             <a:fld id="{52A13B17-C506-4D51-BB37-16B365906619}" type="datetimeFigureOut">
               <a:rPr lang="en-US" smtClean="0"/>
-              <a:t>6/30/20</a:t>
+              <a:t>7/5/20</a:t>
             </a:fld>
             <a:endParaRPr lang="en-US" dirty="0"/>
           </a:p>
@@ -2167,7 +2167,7 @@
                   <a:prstClr val="black"/>
                 </a:solidFill>
               </a:rPr>
-              <a:t>6/30/20 4:36 PM</a:t>
+              <a:t>7/5/20 7:51 PM</a:t>
             </a:fld>
             <a:endParaRPr lang="en-US" dirty="0">
               <a:solidFill>
@@ -17522,22 +17522,34 @@
           <a:p>
             <a:pPr lvl="2"/>
             <a:r>
+              <a:rPr lang="en-US" sz="2800" b="1" dirty="0"/>
+              <a:t>Azure Kubernetes Services (AKS)</a:t>
+            </a:r>
+            <a:r>
               <a:rPr lang="en-US" sz="2800" dirty="0"/>
-              <a:t>Azure Kubernetes Services (AKS) – the ideal solution for a fully managed experience</a:t>
+              <a:t> – the ideal solution for a fully managed experience</a:t>
             </a:r>
           </a:p>
           <a:p>
             <a:pPr lvl="2"/>
             <a:r>
+              <a:rPr lang="en-US" sz="2800" b="1" dirty="0"/>
+              <a:t>Azure Container Instances</a:t>
+            </a:r>
+            <a:r>
               <a:rPr lang="en-US" sz="2800" dirty="0"/>
-              <a:t>Azure Container Instances – simple, isolated, without management tooling, enabling workload scale on demand</a:t>
+              <a:t> – simple, isolated, without management tooling, enabling workload scale on demand</a:t>
             </a:r>
           </a:p>
           <a:p>
             <a:pPr lvl="2"/>
             <a:r>
+              <a:rPr lang="en-US" sz="2800" b="1" dirty="0"/>
+              <a:t>Web App for Containers</a:t>
+            </a:r>
+            <a:r>
               <a:rPr lang="en-US" sz="2800" dirty="0"/>
-              <a:t>Web App for Containers – simple PaaS without full-featured container orchestration</a:t>
+              <a:t> – simple PaaS without full-featured container orchestration</a:t>
             </a:r>
           </a:p>
           <a:p>
@@ -18639,14 +18651,14 @@
             <a:pPr lvl="1"/>
             <a:r>
               <a:rPr lang="en-US" sz="2800" b="1" dirty="0"/>
-              <a:t>Conference sites are currently hosted on Windows Server machines on premise.</a:t>
+              <a:t>Web sites and APIs are built as microservices hosted on Linux servers.</a:t>
             </a:r>
           </a:p>
           <a:p>
             <a:pPr lvl="1" fontAlgn="base"/>
             <a:r>
               <a:rPr lang="en-US" sz="2800" b="1" dirty="0"/>
-              <a:t>The data back-end is a MongoDB cluster also deployed to Windows Server machines on premise.</a:t>
+              <a:t>The on-prem data backend is MongoDB; also running on a separate cluster of Linux servers.</a:t>
             </a:r>
           </a:p>
         </p:txBody>
@@ -18788,7 +18800,7 @@
             <a:pPr lvl="2" fontAlgn="base"/>
             <a:r>
               <a:rPr lang="en-US" sz="2400" b="1" dirty="0"/>
-              <a:t>The tenant’s code is deployed to a specific group of load balanced Windows Server machines dedicated to one or more tenant.</a:t>
+              <a:t>The tenant’s code is deployed to a specific group of load balanced Linux server dedicated to one or more tenant.</a:t>
             </a:r>
           </a:p>
           <a:p>

</xml_diff>

<commit_message>
Update WDS Slide 21 w/ "Azure Kubernetes Service" name fix
</commit_message>
<xml_diff>
--- a/Whiteboard design session/WDS trainer presentation - Cloud-native applications.pptx
+++ b/Whiteboard design session/WDS trainer presentation - Cloud-native applications.pptx
@@ -221,7 +221,7 @@
           <a:p>
             <a:fld id="{52A13B17-C506-4D51-BB37-16B365906619}" type="datetimeFigureOut">
               <a:rPr lang="en-US" smtClean="0"/>
-              <a:t>7/5/20</a:t>
+              <a:t>7/11/20</a:t>
             </a:fld>
             <a:endParaRPr lang="en-US" dirty="0"/>
           </a:p>
@@ -2168,7 +2168,7 @@
                   <a:prstClr val="black"/>
                 </a:solidFill>
               </a:rPr>
-              <a:t>7/5/20 7:51 PM</a:t>
+              <a:t>7/11/20 3:46 PM</a:t>
             </a:fld>
             <a:endParaRPr lang="en-US" dirty="0">
               <a:solidFill>
@@ -17680,7 +17680,7 @@
             <a:pPr lvl="2"/>
             <a:r>
               <a:rPr lang="en-US" sz="2800" dirty="0"/>
-              <a:t>The best option is to go with a managed cluster such as Azure Container Service (AKS), native to Azure</a:t>
+              <a:t>The best option is to go with a managed cluster such as Azure Kubernetes Service (AKS), native to Azure</a:t>
             </a:r>
           </a:p>
         </p:txBody>

</xml_diff>

<commit_message>
update architecture diagram to GitHub Actions
</commit_message>
<xml_diff>
--- a/Whiteboard design session/WDS trainer presentation - Cloud-native applications.pptx
+++ b/Whiteboard design session/WDS trainer presentation - Cloud-native applications.pptx
@@ -221,7 +221,7 @@
           <a:p>
             <a:fld id="{52A13B17-C506-4D51-BB37-16B365906619}" type="datetimeFigureOut">
               <a:rPr lang="en-US" smtClean="0"/>
-              <a:t>7/11/20</a:t>
+              <a:t>8/23/20</a:t>
             </a:fld>
             <a:endParaRPr lang="en-US" dirty="0"/>
           </a:p>
@@ -2168,7 +2168,7 @@
                   <a:prstClr val="black"/>
                 </a:solidFill>
               </a:rPr>
-              <a:t>7/11/20 3:46 PM</a:t>
+              <a:t>8/23/20 8:45 PM</a:t>
             </a:fld>
             <a:endParaRPr lang="en-US" dirty="0">
               <a:solidFill>
@@ -17022,7 +17022,7 @@
             <a:pPr lvl="1"/>
             <a:r>
               <a:rPr lang="en-US" sz="3600" dirty="0"/>
-              <a:t>They also decided to move forward with Azure DevOps for infrastructure and container DevOps workflows.</a:t>
+              <a:t>They also decided to move forward with GitHub Actions for infrastructure and container DevOps workflows.</a:t>
             </a:r>
           </a:p>
           <a:p>
@@ -17121,7 +17121,7 @@
       </p:sp>
       <p:pic>
         <p:nvPicPr>
-          <p:cNvPr id="4" name="Picture 3">
+          <p:cNvPr id="4" name="Picture 3" descr="Solution architecture using Azure Kubernetes Service for hosting microservices, and CI/CD workflow using GitHub Actions.">
             <a:extLst>
               <a:ext uri="{FF2B5EF4-FFF2-40B4-BE49-F238E27FC236}">
                 <a16:creationId xmlns:a16="http://schemas.microsoft.com/office/drawing/2014/main" id="{A77DE13A-AD2C-4759-A6A4-111012127BDB}"/>
@@ -17146,8 +17146,8 @@
         </p:blipFill>
         <p:spPr>
           <a:xfrm>
-            <a:off x="1181177" y="1189176"/>
-            <a:ext cx="9829646" cy="5529175"/>
+            <a:off x="1181178" y="1189176"/>
+            <a:ext cx="9829644" cy="5529175"/>
           </a:xfrm>
           <a:prstGeom prst="rect">
             <a:avLst/>

</xml_diff>

<commit_message>
update student & trainer guides for GitHub Actions
</commit_message>
<xml_diff>
--- a/Whiteboard design session/WDS trainer presentation - Cloud-native applications.pptx
+++ b/Whiteboard design session/WDS trainer presentation - Cloud-native applications.pptx
@@ -221,7 +221,7 @@
           <a:p>
             <a:fld id="{52A13B17-C506-4D51-BB37-16B365906619}" type="datetimeFigureOut">
               <a:rPr lang="en-US" smtClean="0"/>
-              <a:t>8/23/20</a:t>
+              <a:t>8/26/20</a:t>
             </a:fld>
             <a:endParaRPr lang="en-US" dirty="0"/>
           </a:p>
@@ -2168,7 +2168,7 @@
                   <a:prstClr val="black"/>
                 </a:solidFill>
               </a:rPr>
-              <a:t>8/23/20 8:45 PM</a:t>
+              <a:t>8/26/20 3:07 AM</a:t>
             </a:fld>
             <a:endParaRPr lang="en-US" dirty="0">
               <a:solidFill>
@@ -15111,7 +15111,7 @@
                 </a:solidFill>
                 <a:latin typeface="+mj-lt"/>
               </a:rPr>
-              <a:t>Look at Azure DevOps as the CICD tool of choice</a:t>
+              <a:t>Look at GitHub Actions as the CICD tool of choice</a:t>
             </a:r>
           </a:p>
           <a:p>

</xml_diff>